<commit_message>
added slideshare to github static page
</commit_message>
<xml_diff>
--- a/presentation_files/DemoPresentation.pptx
+++ b/presentation_files/DemoPresentation.pptx
@@ -5621,6 +5621,35 @@
           </a:p>
         </p:txBody>
       </p:sp>
+      <p:sp>
+        <p:nvSpPr>
+          <p:cNvPr id="5" name="Rectangle 4"/>
+          <p:cNvSpPr/>
+          <p:nvPr/>
+        </p:nvSpPr>
+        <p:spPr>
+          <a:xfrm>
+            <a:off x="958272" y="3232942"/>
+            <a:ext cx="4572000" cy="646331"/>
+          </a:xfrm>
+          <a:prstGeom prst="rect">
+            <a:avLst/>
+          </a:prstGeom>
+        </p:spPr>
+        <p:txBody>
+          <a:bodyPr>
+            <a:spAutoFit/>
+          </a:bodyPr>
+          <a:lstStyle/>
+          <a:p>
+            <a:r>
+              <a:rPr lang="en-US" dirty="0" smtClean="0"/>
+              <a:t>Smartphone by Martin Jordan from the Noun Project</a:t>
+            </a:r>
+            <a:endParaRPr lang="en-US" dirty="0"/>
+          </a:p>
+        </p:txBody>
+      </p:sp>
     </p:spTree>
   </p:cSld>
   <p:clrMapOvr>

</xml_diff>

<commit_message>
cleanup after hackathon, reducing unnecessary files in repo
</commit_message>
<xml_diff>
--- a/presentation_files/DemoPresentation.pptx
+++ b/presentation_files/DemoPresentation.pptx
@@ -5093,14 +5093,21 @@
                 <a:latin typeface="Avenir Light"/>
                 <a:cs typeface="Avenir Light"/>
               </a:rPr>
-              <a:t>Text </a:t>
+              <a:t>Text</a:t>
+            </a:r>
+            <a:r>
+              <a:rPr lang="en-US" sz="4900" dirty="0" smtClean="0">
+                <a:latin typeface="Avenir Light"/>
+                <a:cs typeface="Avenir Light"/>
+              </a:rPr>
+              <a:t> </a:t>
             </a:r>
             <a:r>
               <a:rPr lang="en-US" sz="4900" b="1" dirty="0" smtClean="0">
                 <a:latin typeface="Avenir Light"/>
                 <a:cs typeface="Avenir Light"/>
               </a:rPr>
-              <a:t>1267920</a:t>
+              <a:t>11888</a:t>
             </a:r>
             <a:endParaRPr lang="en-US" sz="4900" dirty="0">
               <a:latin typeface="Avenir Light"/>
@@ -5142,7 +5149,14 @@
                 <a:latin typeface="Avenir Light"/>
                 <a:cs typeface="Avenir Light"/>
               </a:rPr>
-              <a:t>760) 452 -8549</a:t>
+              <a:t>760) 452 -</a:t>
+            </a:r>
+            <a:r>
+              <a:rPr lang="en-US" sz="4900" b="1" dirty="0" smtClean="0">
+                <a:latin typeface="Avenir Light"/>
+                <a:cs typeface="Avenir Light"/>
+              </a:rPr>
+              <a:t>8548</a:t>
             </a:r>
             <a:endParaRPr lang="en-US" sz="4900" dirty="0">
               <a:latin typeface="Avenir Light"/>

</xml_diff>